<commit_message>
Add "blazingly fast" slides
</commit_message>
<xml_diff>
--- a/slides/slides.pptx
+++ b/slides/slides.pptx
@@ -22,6 +22,11 @@
     <p:sldId id="270" r:id="rId21"/>
     <p:sldId id="271" r:id="rId22"/>
     <p:sldId id="272" r:id="rId23"/>
+    <p:sldId id="273" r:id="rId24"/>
+    <p:sldId id="274" r:id="rId25"/>
+    <p:sldId id="275" r:id="rId26"/>
+    <p:sldId id="276" r:id="rId27"/>
+    <p:sldId id="277" r:id="rId28"/>
   </p:sldIdLst>
   <p:sldSz cx="9144000" cy="6858000" type="screen4x3"/>
   <p:notesSz cx="6858000" cy="9144000"/>
@@ -3472,6 +3477,90 @@
 </p:sld>
 </file>
 
+<file path=ppt/slides/slide18.xml><?xml version="1.0" encoding="utf-8"?>
+<p:sld xmlns:a="http://schemas.openxmlformats.org/drawingml/2006/main" xmlns:p="http://schemas.openxmlformats.org/presentationml/2006/main" xmlns:r="http://schemas.openxmlformats.org/officeDocument/2006/relationships">
+  <p:cSld>
+    <p:spTree>
+      <p:nvGrpSpPr>
+        <p:cNvPr id="1" name=""/>
+        <p:cNvGrpSpPr/>
+        <p:nvPr/>
+      </p:nvGrpSpPr>
+      <p:grpSpPr/>
+      <p:pic>
+        <p:nvPicPr>
+          <p:cNvPr id="2" name="Picture 1" descr="temp_slide_17.png"/>
+          <p:cNvPicPr>
+            <a:picLocks noChangeAspect="1"/>
+          </p:cNvPicPr>
+          <p:nvPr/>
+        </p:nvPicPr>
+        <p:blipFill>
+          <a:blip r:embed="rId2"/>
+          <a:stretch>
+            <a:fillRect/>
+          </a:stretch>
+        </p:blipFill>
+        <p:spPr>
+          <a:xfrm>
+            <a:off x="0" y="0"/>
+            <a:ext cx="9144000" cy="6858000"/>
+          </a:xfrm>
+          <a:prstGeom prst="rect">
+            <a:avLst/>
+          </a:prstGeom>
+        </p:spPr>
+      </p:pic>
+    </p:spTree>
+  </p:cSld>
+  <p:clrMapOvr>
+    <a:masterClrMapping/>
+  </p:clrMapOvr>
+</p:sld>
+</file>
+
+<file path=ppt/slides/slide19.xml><?xml version="1.0" encoding="utf-8"?>
+<p:sld xmlns:a="http://schemas.openxmlformats.org/drawingml/2006/main" xmlns:p="http://schemas.openxmlformats.org/presentationml/2006/main" xmlns:r="http://schemas.openxmlformats.org/officeDocument/2006/relationships">
+  <p:cSld>
+    <p:spTree>
+      <p:nvGrpSpPr>
+        <p:cNvPr id="1" name=""/>
+        <p:cNvGrpSpPr/>
+        <p:nvPr/>
+      </p:nvGrpSpPr>
+      <p:grpSpPr/>
+      <p:pic>
+        <p:nvPicPr>
+          <p:cNvPr id="2" name="Picture 1" descr="temp_slide_18.png"/>
+          <p:cNvPicPr>
+            <a:picLocks noChangeAspect="1"/>
+          </p:cNvPicPr>
+          <p:nvPr/>
+        </p:nvPicPr>
+        <p:blipFill>
+          <a:blip r:embed="rId2"/>
+          <a:stretch>
+            <a:fillRect/>
+          </a:stretch>
+        </p:blipFill>
+        <p:spPr>
+          <a:xfrm>
+            <a:off x="0" y="0"/>
+            <a:ext cx="9144000" cy="6858000"/>
+          </a:xfrm>
+          <a:prstGeom prst="rect">
+            <a:avLst/>
+          </a:prstGeom>
+        </p:spPr>
+      </p:pic>
+    </p:spTree>
+  </p:cSld>
+  <p:clrMapOvr>
+    <a:masterClrMapping/>
+  </p:clrMapOvr>
+</p:sld>
+</file>
+
 <file path=ppt/slides/slide2.xml><?xml version="1.0" encoding="utf-8"?>
 <p:sld xmlns:a="http://schemas.openxmlformats.org/drawingml/2006/main" xmlns:p="http://schemas.openxmlformats.org/presentationml/2006/main" xmlns:r="http://schemas.openxmlformats.org/officeDocument/2006/relationships">
   <p:cSld>
@@ -3485,6 +3574,132 @@
       <p:pic>
         <p:nvPicPr>
           <p:cNvPr id="2" name="Picture 1" descr="temp_slide_1.png"/>
+          <p:cNvPicPr>
+            <a:picLocks noChangeAspect="1"/>
+          </p:cNvPicPr>
+          <p:nvPr/>
+        </p:nvPicPr>
+        <p:blipFill>
+          <a:blip r:embed="rId2"/>
+          <a:stretch>
+            <a:fillRect/>
+          </a:stretch>
+        </p:blipFill>
+        <p:spPr>
+          <a:xfrm>
+            <a:off x="0" y="0"/>
+            <a:ext cx="9144000" cy="6858000"/>
+          </a:xfrm>
+          <a:prstGeom prst="rect">
+            <a:avLst/>
+          </a:prstGeom>
+        </p:spPr>
+      </p:pic>
+    </p:spTree>
+  </p:cSld>
+  <p:clrMapOvr>
+    <a:masterClrMapping/>
+  </p:clrMapOvr>
+</p:sld>
+</file>
+
+<file path=ppt/slides/slide20.xml><?xml version="1.0" encoding="utf-8"?>
+<p:sld xmlns:a="http://schemas.openxmlformats.org/drawingml/2006/main" xmlns:p="http://schemas.openxmlformats.org/presentationml/2006/main" xmlns:r="http://schemas.openxmlformats.org/officeDocument/2006/relationships">
+  <p:cSld>
+    <p:spTree>
+      <p:nvGrpSpPr>
+        <p:cNvPr id="1" name=""/>
+        <p:cNvGrpSpPr/>
+        <p:nvPr/>
+      </p:nvGrpSpPr>
+      <p:grpSpPr/>
+      <p:pic>
+        <p:nvPicPr>
+          <p:cNvPr id="2" name="Picture 1" descr="temp_slide_19.png"/>
+          <p:cNvPicPr>
+            <a:picLocks noChangeAspect="1"/>
+          </p:cNvPicPr>
+          <p:nvPr/>
+        </p:nvPicPr>
+        <p:blipFill>
+          <a:blip r:embed="rId2"/>
+          <a:stretch>
+            <a:fillRect/>
+          </a:stretch>
+        </p:blipFill>
+        <p:spPr>
+          <a:xfrm>
+            <a:off x="0" y="0"/>
+            <a:ext cx="9144000" cy="6858000"/>
+          </a:xfrm>
+          <a:prstGeom prst="rect">
+            <a:avLst/>
+          </a:prstGeom>
+        </p:spPr>
+      </p:pic>
+    </p:spTree>
+  </p:cSld>
+  <p:clrMapOvr>
+    <a:masterClrMapping/>
+  </p:clrMapOvr>
+</p:sld>
+</file>
+
+<file path=ppt/slides/slide21.xml><?xml version="1.0" encoding="utf-8"?>
+<p:sld xmlns:a="http://schemas.openxmlformats.org/drawingml/2006/main" xmlns:p="http://schemas.openxmlformats.org/presentationml/2006/main" xmlns:r="http://schemas.openxmlformats.org/officeDocument/2006/relationships">
+  <p:cSld>
+    <p:spTree>
+      <p:nvGrpSpPr>
+        <p:cNvPr id="1" name=""/>
+        <p:cNvGrpSpPr/>
+        <p:nvPr/>
+      </p:nvGrpSpPr>
+      <p:grpSpPr/>
+      <p:pic>
+        <p:nvPicPr>
+          <p:cNvPr id="2" name="Picture 1" descr="temp_slide_20.png"/>
+          <p:cNvPicPr>
+            <a:picLocks noChangeAspect="1"/>
+          </p:cNvPicPr>
+          <p:nvPr/>
+        </p:nvPicPr>
+        <p:blipFill>
+          <a:blip r:embed="rId2"/>
+          <a:stretch>
+            <a:fillRect/>
+          </a:stretch>
+        </p:blipFill>
+        <p:spPr>
+          <a:xfrm>
+            <a:off x="0" y="0"/>
+            <a:ext cx="9144000" cy="6858000"/>
+          </a:xfrm>
+          <a:prstGeom prst="rect">
+            <a:avLst/>
+          </a:prstGeom>
+        </p:spPr>
+      </p:pic>
+    </p:spTree>
+  </p:cSld>
+  <p:clrMapOvr>
+    <a:masterClrMapping/>
+  </p:clrMapOvr>
+</p:sld>
+</file>
+
+<file path=ppt/slides/slide22.xml><?xml version="1.0" encoding="utf-8"?>
+<p:sld xmlns:a="http://schemas.openxmlformats.org/drawingml/2006/main" xmlns:p="http://schemas.openxmlformats.org/presentationml/2006/main" xmlns:r="http://schemas.openxmlformats.org/officeDocument/2006/relationships">
+  <p:cSld>
+    <p:spTree>
+      <p:nvGrpSpPr>
+        <p:cNvPr id="1" name=""/>
+        <p:cNvGrpSpPr/>
+        <p:nvPr/>
+      </p:nvGrpSpPr>
+      <p:grpSpPr/>
+      <p:pic>
+        <p:nvPicPr>
+          <p:cNvPr id="2" name="Picture 1" descr="temp_slide_21.png"/>
           <p:cNvPicPr>
             <a:picLocks noChangeAspect="1"/>
           </p:cNvPicPr>

</xml_diff>

<commit_message>
Add second last slide
</commit_message>
<xml_diff>
--- a/slides/slides.pptx
+++ b/slides/slides.pptx
@@ -27,6 +27,7 @@
     <p:sldId id="275" r:id="rId26"/>
     <p:sldId id="276" r:id="rId27"/>
     <p:sldId id="277" r:id="rId28"/>
+    <p:sldId id="278" r:id="rId29"/>
   </p:sldIdLst>
   <p:sldSz cx="9144000" cy="6858000" type="screen4x3"/>
   <p:notesSz cx="6858000" cy="9144000"/>
@@ -3700,6 +3701,48 @@
       <p:pic>
         <p:nvPicPr>
           <p:cNvPr id="2" name="Picture 1" descr="temp_slide_21.png"/>
+          <p:cNvPicPr>
+            <a:picLocks noChangeAspect="1"/>
+          </p:cNvPicPr>
+          <p:nvPr/>
+        </p:nvPicPr>
+        <p:blipFill>
+          <a:blip r:embed="rId2"/>
+          <a:stretch>
+            <a:fillRect/>
+          </a:stretch>
+        </p:blipFill>
+        <p:spPr>
+          <a:xfrm>
+            <a:off x="0" y="0"/>
+            <a:ext cx="9144000" cy="6858000"/>
+          </a:xfrm>
+          <a:prstGeom prst="rect">
+            <a:avLst/>
+          </a:prstGeom>
+        </p:spPr>
+      </p:pic>
+    </p:spTree>
+  </p:cSld>
+  <p:clrMapOvr>
+    <a:masterClrMapping/>
+  </p:clrMapOvr>
+</p:sld>
+</file>
+
+<file path=ppt/slides/slide23.xml><?xml version="1.0" encoding="utf-8"?>
+<p:sld xmlns:a="http://schemas.openxmlformats.org/drawingml/2006/main" xmlns:p="http://schemas.openxmlformats.org/presentationml/2006/main" xmlns:r="http://schemas.openxmlformats.org/officeDocument/2006/relationships">
+  <p:cSld>
+    <p:spTree>
+      <p:nvGrpSpPr>
+        <p:cNvPr id="1" name=""/>
+        <p:cNvGrpSpPr/>
+        <p:nvPr/>
+      </p:nvGrpSpPr>
+      <p:grpSpPr/>
+      <p:pic>
+        <p:nvPicPr>
+          <p:cNvPr id="2" name="Picture 1" descr="temp_slide_22.png"/>
           <p:cNvPicPr>
             <a:picLocks noChangeAspect="1"/>
           </p:cNvPicPr>

</xml_diff>